<commit_message>
[UPDATE] session 16 slides
</commit_message>
<xml_diff>
--- a/materials/session_16/PL/ML-Session16-PL.pptx
+++ b/materials/session_16/PL/ML-Session16-PL.pptx
@@ -119,8 +119,7 @@
 <file path=ppt/revisionInfo.xml><?xml version="1.0" encoding="utf-8"?>
 <p1510:revInfo xmlns:a="http://schemas.openxmlformats.org/drawingml/2006/main" xmlns:r="http://schemas.openxmlformats.org/officeDocument/2006/relationships" xmlns:p1510="http://schemas.microsoft.com/office/powerpoint/2015/10/main">
   <p1510:revLst>
-    <p1510:client id="{69F540B1-05E9-9E0A-8C17-70E20D8F92F0}" v="104" dt="2024-04-09T07:49:33.712"/>
-    <p1510:client id="{7F21D346-808C-14ED-EDFC-34D59189721B}" v="20" dt="2024-04-09T07:36:40.004"/>
+    <p1510:client id="{43BAF97C-4DFB-35EE-9087-BA2894784668}" v="26" dt="2024-04-11T13:41:54.230"/>
   </p1510:revLst>
 </p1510:revInfo>
 </file>
@@ -254,7 +253,7 @@
           <a:p>
             <a:fld id="{E431C0BB-DC71-4713-A787-95011EDB8CA8}" type="datetimeFigureOut">
               <a:rPr lang="pt-PT" smtClean="0"/>
-              <a:t>09/04/2024</a:t>
+              <a:t>11/04/2024</a:t>
             </a:fld>
             <a:endParaRPr lang="pt-PT"/>
           </a:p>
@@ -422,7 +421,7 @@
           <a:p>
             <a:fld id="{E431C0BB-DC71-4713-A787-95011EDB8CA8}" type="datetimeFigureOut">
               <a:rPr lang="pt-PT" smtClean="0"/>
-              <a:t>09/04/2024</a:t>
+              <a:t>11/04/2024</a:t>
             </a:fld>
             <a:endParaRPr lang="pt-PT"/>
           </a:p>
@@ -600,7 +599,7 @@
           <a:p>
             <a:fld id="{E431C0BB-DC71-4713-A787-95011EDB8CA8}" type="datetimeFigureOut">
               <a:rPr lang="pt-PT" smtClean="0"/>
-              <a:t>09/04/2024</a:t>
+              <a:t>11/04/2024</a:t>
             </a:fld>
             <a:endParaRPr lang="pt-PT"/>
           </a:p>
@@ -768,7 +767,7 @@
           <a:p>
             <a:fld id="{E431C0BB-DC71-4713-A787-95011EDB8CA8}" type="datetimeFigureOut">
               <a:rPr lang="pt-PT" smtClean="0"/>
-              <a:t>09/04/2024</a:t>
+              <a:t>11/04/2024</a:t>
             </a:fld>
             <a:endParaRPr lang="pt-PT"/>
           </a:p>
@@ -1013,7 +1012,7 @@
           <a:p>
             <a:fld id="{E431C0BB-DC71-4713-A787-95011EDB8CA8}" type="datetimeFigureOut">
               <a:rPr lang="pt-PT" smtClean="0"/>
-              <a:t>09/04/2024</a:t>
+              <a:t>11/04/2024</a:t>
             </a:fld>
             <a:endParaRPr lang="pt-PT"/>
           </a:p>
@@ -1242,7 +1241,7 @@
           <a:p>
             <a:fld id="{E431C0BB-DC71-4713-A787-95011EDB8CA8}" type="datetimeFigureOut">
               <a:rPr lang="pt-PT" smtClean="0"/>
-              <a:t>09/04/2024</a:t>
+              <a:t>11/04/2024</a:t>
             </a:fld>
             <a:endParaRPr lang="pt-PT"/>
           </a:p>
@@ -1606,7 +1605,7 @@
           <a:p>
             <a:fld id="{E431C0BB-DC71-4713-A787-95011EDB8CA8}" type="datetimeFigureOut">
               <a:rPr lang="pt-PT" smtClean="0"/>
-              <a:t>09/04/2024</a:t>
+              <a:t>11/04/2024</a:t>
             </a:fld>
             <a:endParaRPr lang="pt-PT"/>
           </a:p>
@@ -1723,7 +1722,7 @@
           <a:p>
             <a:fld id="{E431C0BB-DC71-4713-A787-95011EDB8CA8}" type="datetimeFigureOut">
               <a:rPr lang="pt-PT" smtClean="0"/>
-              <a:t>09/04/2024</a:t>
+              <a:t>11/04/2024</a:t>
             </a:fld>
             <a:endParaRPr lang="pt-PT"/>
           </a:p>
@@ -1818,7 +1817,7 @@
           <a:p>
             <a:fld id="{E431C0BB-DC71-4713-A787-95011EDB8CA8}" type="datetimeFigureOut">
               <a:rPr lang="pt-PT" smtClean="0"/>
-              <a:t>09/04/2024</a:t>
+              <a:t>11/04/2024</a:t>
             </a:fld>
             <a:endParaRPr lang="pt-PT"/>
           </a:p>
@@ -2093,7 +2092,7 @@
           <a:p>
             <a:fld id="{E431C0BB-DC71-4713-A787-95011EDB8CA8}" type="datetimeFigureOut">
               <a:rPr lang="pt-PT" smtClean="0"/>
-              <a:t>09/04/2024</a:t>
+              <a:t>11/04/2024</a:t>
             </a:fld>
             <a:endParaRPr lang="pt-PT"/>
           </a:p>
@@ -2345,7 +2344,7 @@
           <a:p>
             <a:fld id="{E431C0BB-DC71-4713-A787-95011EDB8CA8}" type="datetimeFigureOut">
               <a:rPr lang="pt-PT" smtClean="0"/>
-              <a:t>09/04/2024</a:t>
+              <a:t>11/04/2024</a:t>
             </a:fld>
             <a:endParaRPr lang="pt-PT"/>
           </a:p>
@@ -2556,7 +2555,7 @@
           <a:p>
             <a:fld id="{E431C0BB-DC71-4713-A787-95011EDB8CA8}" type="datetimeFigureOut">
               <a:rPr lang="pt-PT" smtClean="0"/>
-              <a:t>09/04/2024</a:t>
+              <a:t>11/04/2024</a:t>
             </a:fld>
             <a:endParaRPr lang="pt-PT"/>
           </a:p>
@@ -3783,7 +3782,7 @@
                 <a:latin typeface="Calibri"/>
                 <a:cs typeface="Calibri"/>
               </a:rPr>
-              <a:t> 15 - PL</a:t>
+              <a:t> 16 - PL</a:t>
             </a:r>
           </a:p>
         </p:txBody>
@@ -4334,7 +4333,7 @@
                 <a:latin typeface="Times New Roman"/>
                 <a:cs typeface="Times New Roman"/>
               </a:rPr>
-              <a:t> 15</a:t>
+              <a:t> 16</a:t>
             </a:r>
             <a:endParaRPr lang="pt-PT" dirty="0"/>
           </a:p>
@@ -5146,7 +5145,7 @@
                 <a:latin typeface="Times New Roman"/>
                 <a:cs typeface="Times New Roman"/>
               </a:rPr>
-              <a:t> 15</a:t>
+              <a:t> 16</a:t>
             </a:r>
             <a:endParaRPr lang="pt-PT" dirty="0"/>
           </a:p>
@@ -5972,7 +5971,7 @@
                 <a:latin typeface="Times New Roman"/>
                 <a:cs typeface="Times New Roman"/>
               </a:rPr>
-              <a:t> 15</a:t>
+              <a:t> 16</a:t>
             </a:r>
             <a:endParaRPr lang="pt-PT" dirty="0"/>
           </a:p>
@@ -6776,7 +6775,7 @@
                 <a:latin typeface="Times New Roman"/>
                 <a:cs typeface="Times New Roman"/>
               </a:rPr>
-              <a:t> 15</a:t>
+              <a:t> 16</a:t>
             </a:r>
             <a:endParaRPr lang="pt-PT" dirty="0"/>
           </a:p>
@@ -7104,7 +7103,7 @@
                 <a:ea typeface="+mn-lt"/>
                 <a:cs typeface="+mn-lt"/>
               </a:rPr>
-              <a:t>/session15/</a:t>
+              <a:t>/session16/</a:t>
             </a:r>
             <a:r>
               <a:rPr lang="pt-PT" dirty="0" err="1">
@@ -7179,7 +7178,7 @@
                 <a:ea typeface="+mn-lt"/>
                 <a:cs typeface="+mn-lt"/>
               </a:rPr>
-              <a:t>/session15/</a:t>
+              <a:t>/session16/</a:t>
             </a:r>
             <a:r>
               <a:rPr lang="pt-PT" dirty="0" err="1">

</xml_diff>